<commit_message>
Update test files for PPTX and XLSX formats to reflect recent changes and added an app
</commit_message>
<xml_diff>
--- a/tests/ppt_test/test.pptx
+++ b/tests/ppt_test/test.pptx
@@ -6,6 +6,7 @@
   </p:sldMasterIdLst>
   <p:sldIdLst>
     <p:sldId id="256" r:id="rId2"/>
+    <p:sldId id="257" r:id="rId3"/>
   </p:sldIdLst>
   <p:sldSz cx="12192000" cy="6858000"/>
   <p:notesSz cx="6858000" cy="9144000"/>
@@ -684,6 +685,434 @@
 </c:chartSpace>
 </file>
 
+<file path=ppt/charts/chart2.xml><?xml version="1.0" encoding="utf-8"?>
+<c:chartSpace xmlns:c="http://schemas.openxmlformats.org/drawingml/2006/chart" xmlns:a="http://schemas.openxmlformats.org/drawingml/2006/main" xmlns:r="http://schemas.openxmlformats.org/officeDocument/2006/relationships" xmlns:c16r2="http://schemas.microsoft.com/office/drawing/2015/06/chart">
+  <c:date1904 val="0"/>
+  <c:lang val="fr-FR"/>
+  <c:roundedCorners val="0"/>
+  <mc:AlternateContent xmlns:mc="http://schemas.openxmlformats.org/markup-compatibility/2006">
+    <mc:Choice xmlns:c14="http://schemas.microsoft.com/office/drawing/2007/8/2/chart" Requires="c14">
+      <c14:style val="102"/>
+    </mc:Choice>
+    <mc:Fallback>
+      <c:style val="2"/>
+    </mc:Fallback>
+  </mc:AlternateContent>
+  <c:chart>
+    <c:autoTitleDeleted val="1"/>
+    <c:plotArea>
+      <c:layout/>
+      <c:lineChart>
+        <c:grouping val="standard"/>
+        <c:varyColors val="0"/>
+        <c:ser>
+          <c:idx val="0"/>
+          <c:order val="0"/>
+          <c:tx>
+            <c:strRef>
+              <c:f>Feuil1!$C$1</c:f>
+              <c:strCache>
+                <c:ptCount val="1"/>
+                <c:pt idx="0">
+                  <c:v>VALUE</c:v>
+                </c:pt>
+              </c:strCache>
+            </c:strRef>
+          </c:tx>
+          <c:spPr>
+            <a:ln w="22225" cap="rnd">
+              <a:solidFill>
+                <a:schemeClr val="accent1"/>
+              </a:solidFill>
+              <a:round/>
+            </a:ln>
+            <a:effectLst/>
+          </c:spPr>
+          <c:marker>
+            <c:symbol val="diamond"/>
+            <c:size val="6"/>
+            <c:spPr>
+              <a:solidFill>
+                <a:schemeClr val="accent1"/>
+              </a:solidFill>
+              <a:ln w="9525">
+                <a:solidFill>
+                  <a:schemeClr val="accent1"/>
+                </a:solidFill>
+                <a:round/>
+              </a:ln>
+              <a:effectLst/>
+            </c:spPr>
+          </c:marker>
+          <c:dLbls>
+            <c:spPr>
+              <a:noFill/>
+              <a:ln>
+                <a:noFill/>
+              </a:ln>
+              <a:effectLst/>
+            </c:spPr>
+            <c:txPr>
+              <a:bodyPr rot="0" spcFirstLastPara="1" vertOverflow="ellipsis" vert="horz" wrap="square" lIns="38100" tIns="19050" rIns="38100" bIns="19050" anchor="ctr" anchorCtr="1">
+                <a:spAutoFit/>
+              </a:bodyPr>
+              <a:lstStyle/>
+              <a:p>
+                <a:pPr>
+                  <a:defRPr sz="900" b="0" i="0" u="none" strike="noStrike" kern="1200" baseline="0">
+                    <a:solidFill>
+                      <a:schemeClr val="tx1">
+                        <a:lumMod val="50000"/>
+                        <a:lumOff val="50000"/>
+                      </a:schemeClr>
+                    </a:solidFill>
+                    <a:latin typeface="+mn-lt"/>
+                    <a:ea typeface="+mn-ea"/>
+                    <a:cs typeface="+mn-cs"/>
+                  </a:defRPr>
+                </a:pPr>
+                <a:endParaRPr lang="fr-FR"/>
+              </a:p>
+            </c:txPr>
+            <c:dLblPos val="t"/>
+            <c:showLegendKey val="0"/>
+            <c:showVal val="1"/>
+            <c:showCatName val="0"/>
+            <c:showSerName val="0"/>
+            <c:showPercent val="0"/>
+            <c:showBubbleSize val="0"/>
+            <c:showLeaderLines val="0"/>
+            <c:extLst>
+              <c:ext xmlns:c15="http://schemas.microsoft.com/office/drawing/2012/chart" uri="{CE6537A1-D6FC-4f65-9D91-7224C49458BB}">
+                <c15:showLeaderLines val="1"/>
+                <c15:leaderLines>
+                  <c:spPr>
+                    <a:ln w="9525">
+                      <a:solidFill>
+                        <a:schemeClr val="tx1">
+                          <a:lumMod val="35000"/>
+                          <a:lumOff val="65000"/>
+                        </a:schemeClr>
+                      </a:solidFill>
+                    </a:ln>
+                    <a:effectLst/>
+                  </c:spPr>
+                </c15:leaderLines>
+              </c:ext>
+            </c:extLst>
+          </c:dLbls>
+          <c:trendline>
+            <c:spPr>
+              <a:ln w="19050" cap="rnd">
+                <a:solidFill>
+                  <a:schemeClr val="accent1"/>
+                </a:solidFill>
+                <a:prstDash val="sysDash"/>
+              </a:ln>
+              <a:effectLst/>
+            </c:spPr>
+            <c:trendlineType val="linear"/>
+            <c:dispRSqr val="0"/>
+            <c:dispEq val="0"/>
+          </c:trendline>
+          <c:trendline>
+            <c:spPr>
+              <a:ln w="19050" cap="rnd">
+                <a:solidFill>
+                  <a:schemeClr val="accent1"/>
+                </a:solidFill>
+                <a:prstDash val="sysDash"/>
+              </a:ln>
+              <a:effectLst/>
+            </c:spPr>
+            <c:trendlineType val="linear"/>
+            <c:forward val="2"/>
+            <c:dispRSqr val="0"/>
+            <c:dispEq val="0"/>
+          </c:trendline>
+          <c:trendline>
+            <c:spPr>
+              <a:ln w="19050" cap="rnd">
+                <a:solidFill>
+                  <a:schemeClr val="accent1"/>
+                </a:solidFill>
+                <a:prstDash val="sysDash"/>
+              </a:ln>
+              <a:effectLst/>
+            </c:spPr>
+            <c:trendlineType val="linear"/>
+            <c:forward val="2"/>
+            <c:dispRSqr val="0"/>
+            <c:dispEq val="0"/>
+          </c:trendline>
+          <c:trendline>
+            <c:spPr>
+              <a:ln w="19050" cap="rnd">
+                <a:solidFill>
+                  <a:schemeClr val="accent1"/>
+                </a:solidFill>
+                <a:prstDash val="sysDash"/>
+              </a:ln>
+              <a:effectLst/>
+            </c:spPr>
+            <c:trendlineType val="linear"/>
+            <c:forward val="2"/>
+            <c:dispRSqr val="0"/>
+            <c:dispEq val="0"/>
+          </c:trendline>
+          <c:cat>
+            <c:strRef>
+              <c:f>Feuil1!$B$2:$B$11</c:f>
+              <c:strCache>
+                <c:ptCount val="10"/>
+                <c:pt idx="0">
+                  <c:v>janvier</c:v>
+                </c:pt>
+                <c:pt idx="1">
+                  <c:v>février</c:v>
+                </c:pt>
+                <c:pt idx="2">
+                  <c:v>mars</c:v>
+                </c:pt>
+                <c:pt idx="3">
+                  <c:v>avril</c:v>
+                </c:pt>
+                <c:pt idx="4">
+                  <c:v>mai</c:v>
+                </c:pt>
+                <c:pt idx="5">
+                  <c:v>juin</c:v>
+                </c:pt>
+                <c:pt idx="6">
+                  <c:v>juillet</c:v>
+                </c:pt>
+                <c:pt idx="7">
+                  <c:v>août</c:v>
+                </c:pt>
+                <c:pt idx="8">
+                  <c:v>septembre</c:v>
+                </c:pt>
+                <c:pt idx="9">
+                  <c:v>octobre</c:v>
+                </c:pt>
+              </c:strCache>
+            </c:strRef>
+          </c:cat>
+          <c:val>
+            <c:numRef>
+              <c:f>Feuil1!$C$2:$C$11</c:f>
+              <c:numCache>
+                <c:formatCode>General</c:formatCode>
+                <c:ptCount val="10"/>
+                <c:pt idx="0">
+                  <c:v>5</c:v>
+                </c:pt>
+                <c:pt idx="1">
+                  <c:v>18</c:v>
+                </c:pt>
+                <c:pt idx="2">
+                  <c:v>451</c:v>
+                </c:pt>
+                <c:pt idx="3">
+                  <c:v>100</c:v>
+                </c:pt>
+                <c:pt idx="4">
+                  <c:v>50</c:v>
+                </c:pt>
+                <c:pt idx="5">
+                  <c:v>123</c:v>
+                </c:pt>
+                <c:pt idx="6">
+                  <c:v>11</c:v>
+                </c:pt>
+                <c:pt idx="7">
+                  <c:v>16</c:v>
+                </c:pt>
+                <c:pt idx="8">
+                  <c:v>500</c:v>
+                </c:pt>
+                <c:pt idx="9">
+                  <c:v>140</c:v>
+                </c:pt>
+              </c:numCache>
+            </c:numRef>
+          </c:val>
+          <c:smooth val="0"/>
+          <c:extLst>
+            <c:ext xmlns:c16="http://schemas.microsoft.com/office/drawing/2014/chart" uri="{C3380CC4-5D6E-409C-BE32-E72D297353CC}">
+              <c16:uniqueId val="{00000004-7C5F-43C7-81D8-7836D8B3F52B}"/>
+            </c:ext>
+          </c:extLst>
+        </c:ser>
+        <c:dLbls>
+          <c:dLblPos val="t"/>
+          <c:showLegendKey val="0"/>
+          <c:showVal val="1"/>
+          <c:showCatName val="0"/>
+          <c:showSerName val="0"/>
+          <c:showPercent val="0"/>
+          <c:showBubbleSize val="0"/>
+        </c:dLbls>
+        <c:marker val="1"/>
+        <c:smooth val="0"/>
+        <c:axId val="1900382783"/>
+        <c:axId val="1900383263"/>
+      </c:lineChart>
+      <c:catAx>
+        <c:axId val="1900382783"/>
+        <c:scaling>
+          <c:orientation val="minMax"/>
+        </c:scaling>
+        <c:delete val="0"/>
+        <c:axPos val="b"/>
+        <c:majorGridlines>
+          <c:spPr>
+            <a:ln w="9525" cap="flat" cmpd="sng" algn="ctr">
+              <a:solidFill>
+                <a:schemeClr val="tx1">
+                  <a:lumMod val="15000"/>
+                  <a:lumOff val="85000"/>
+                </a:schemeClr>
+              </a:solidFill>
+              <a:round/>
+            </a:ln>
+            <a:effectLst/>
+          </c:spPr>
+        </c:majorGridlines>
+        <c:numFmt formatCode="General" sourceLinked="1"/>
+        <c:majorTickMark val="none"/>
+        <c:minorTickMark val="none"/>
+        <c:tickLblPos val="nextTo"/>
+        <c:spPr>
+          <a:noFill/>
+          <a:ln w="9525" cap="flat" cmpd="sng" algn="ctr">
+            <a:solidFill>
+              <a:schemeClr val="tx1">
+                <a:lumMod val="15000"/>
+                <a:lumOff val="85000"/>
+              </a:schemeClr>
+            </a:solidFill>
+            <a:round/>
+          </a:ln>
+          <a:effectLst/>
+        </c:spPr>
+        <c:txPr>
+          <a:bodyPr rot="2220000" spcFirstLastPara="1" vertOverflow="ellipsis" wrap="square" anchor="ctr" anchorCtr="1"/>
+          <a:lstStyle/>
+          <a:p>
+            <a:pPr>
+              <a:defRPr sz="800" b="0" i="0" u="none" strike="noStrike" kern="1200" cap="all" spc="120" normalizeH="0" baseline="0">
+                <a:solidFill>
+                  <a:schemeClr val="tx1">
+                    <a:lumMod val="65000"/>
+                    <a:lumOff val="35000"/>
+                  </a:schemeClr>
+                </a:solidFill>
+                <a:latin typeface="+mn-lt"/>
+                <a:ea typeface="+mn-ea"/>
+                <a:cs typeface="+mn-cs"/>
+              </a:defRPr>
+            </a:pPr>
+            <a:endParaRPr lang="fr-FR"/>
+          </a:p>
+        </c:txPr>
+        <c:crossAx val="1900383263"/>
+        <c:crosses val="autoZero"/>
+        <c:auto val="1"/>
+        <c:lblAlgn val="ctr"/>
+        <c:lblOffset val="100"/>
+        <c:noMultiLvlLbl val="0"/>
+      </c:catAx>
+      <c:valAx>
+        <c:axId val="1900383263"/>
+        <c:scaling>
+          <c:orientation val="minMax"/>
+        </c:scaling>
+        <c:delete val="0"/>
+        <c:axPos val="l"/>
+        <c:numFmt formatCode="General" sourceLinked="1"/>
+        <c:majorTickMark val="none"/>
+        <c:minorTickMark val="none"/>
+        <c:tickLblPos val="nextTo"/>
+        <c:spPr>
+          <a:noFill/>
+          <a:ln w="9525" cap="flat" cmpd="sng" algn="ctr">
+            <a:solidFill>
+              <a:schemeClr val="dk1">
+                <a:lumMod val="15000"/>
+                <a:lumOff val="85000"/>
+              </a:schemeClr>
+            </a:solidFill>
+            <a:round/>
+          </a:ln>
+          <a:effectLst/>
+        </c:spPr>
+        <c:txPr>
+          <a:bodyPr rot="-60000000" spcFirstLastPara="1" vertOverflow="ellipsis" vert="horz" wrap="square" anchor="ctr" anchorCtr="1"/>
+          <a:lstStyle/>
+          <a:p>
+            <a:pPr>
+              <a:defRPr sz="900" b="0" i="0" u="none" strike="noStrike" kern="1200" baseline="0">
+                <a:solidFill>
+                  <a:schemeClr val="tx1">
+                    <a:lumMod val="65000"/>
+                    <a:lumOff val="35000"/>
+                  </a:schemeClr>
+                </a:solidFill>
+                <a:latin typeface="+mn-lt"/>
+                <a:ea typeface="+mn-ea"/>
+                <a:cs typeface="+mn-cs"/>
+              </a:defRPr>
+            </a:pPr>
+            <a:endParaRPr lang="fr-FR"/>
+          </a:p>
+        </c:txPr>
+        <c:crossAx val="1900382783"/>
+        <c:crosses val="autoZero"/>
+        <c:crossBetween val="between"/>
+      </c:valAx>
+      <c:spPr>
+        <a:noFill/>
+        <a:ln>
+          <a:noFill/>
+        </a:ln>
+        <a:effectLst/>
+      </c:spPr>
+    </c:plotArea>
+    <c:plotVisOnly val="1"/>
+    <c:dispBlanksAs val="gap"/>
+    <c:showDLblsOverMax val="0"/>
+    <c:extLst>
+      <c:ext xmlns:c16r3="http://schemas.microsoft.com/office/drawing/2017/03/chart" uri="{56B9EC1D-385E-4148-901F-78D8002777C0}">
+        <c16r3:dataDisplayOptions16>
+          <c16r3:dispNaAsBlank val="1"/>
+        </c16r3:dataDisplayOptions16>
+      </c:ext>
+    </c:extLst>
+  </c:chart>
+  <c:spPr>
+    <a:noFill/>
+    <a:ln>
+      <a:noFill/>
+    </a:ln>
+    <a:effectLst/>
+  </c:spPr>
+  <c:txPr>
+    <a:bodyPr/>
+    <a:lstStyle/>
+    <a:p>
+      <a:pPr>
+        <a:defRPr/>
+      </a:pPr>
+      <a:endParaRPr lang="fr-FR"/>
+    </a:p>
+  </c:txPr>
+  <c:externalData r:id="rId3">
+    <c:autoUpdate val="0"/>
+  </c:externalData>
+</c:chartSpace>
+</file>
+
 <file path=ppt/charts/colors1.xml><?xml version="1.0" encoding="utf-8"?>
 <cs:colorStyle xmlns:cs="http://schemas.microsoft.com/office/drawing/2012/chartStyle" xmlns:a="http://schemas.openxmlformats.org/drawingml/2006/main" meth="cycle" id="10">
   <a:schemeClr val="accent1"/>
@@ -724,7 +1153,568 @@
 </cs:colorStyle>
 </file>
 
+<file path=ppt/charts/colors2.xml><?xml version="1.0" encoding="utf-8"?>
+<cs:colorStyle xmlns:cs="http://schemas.microsoft.com/office/drawing/2012/chartStyle" xmlns:a="http://schemas.openxmlformats.org/drawingml/2006/main" meth="cycle" id="10">
+  <a:schemeClr val="accent1"/>
+  <a:schemeClr val="accent2"/>
+  <a:schemeClr val="accent3"/>
+  <a:schemeClr val="accent4"/>
+  <a:schemeClr val="accent5"/>
+  <a:schemeClr val="accent6"/>
+  <cs:variation/>
+  <cs:variation>
+    <a:lumMod val="60000"/>
+  </cs:variation>
+  <cs:variation>
+    <a:lumMod val="80000"/>
+    <a:lumOff val="20000"/>
+  </cs:variation>
+  <cs:variation>
+    <a:lumMod val="80000"/>
+  </cs:variation>
+  <cs:variation>
+    <a:lumMod val="60000"/>
+    <a:lumOff val="40000"/>
+  </cs:variation>
+  <cs:variation>
+    <a:lumMod val="50000"/>
+  </cs:variation>
+  <cs:variation>
+    <a:lumMod val="70000"/>
+    <a:lumOff val="30000"/>
+  </cs:variation>
+  <cs:variation>
+    <a:lumMod val="70000"/>
+  </cs:variation>
+  <cs:variation>
+    <a:lumMod val="50000"/>
+    <a:lumOff val="50000"/>
+  </cs:variation>
+</cs:colorStyle>
+</file>
+
 <file path=ppt/charts/style1.xml><?xml version="1.0" encoding="utf-8"?>
+<cs:chartStyle xmlns:cs="http://schemas.microsoft.com/office/drawing/2012/chartStyle" xmlns:a="http://schemas.openxmlformats.org/drawingml/2006/main" id="239">
+  <cs:axisTitle>
+    <cs:lnRef idx="0"/>
+    <cs:fillRef idx="0"/>
+    <cs:effectRef idx="0"/>
+    <cs:fontRef idx="minor">
+      <a:schemeClr val="tx1">
+        <a:lumMod val="65000"/>
+        <a:lumOff val="35000"/>
+      </a:schemeClr>
+    </cs:fontRef>
+    <cs:defRPr sz="900" kern="1200" cap="all"/>
+  </cs:axisTitle>
+  <cs:categoryAxis>
+    <cs:lnRef idx="0"/>
+    <cs:fillRef idx="0"/>
+    <cs:effectRef idx="0"/>
+    <cs:fontRef idx="minor">
+      <a:schemeClr val="tx1">
+        <a:lumMod val="65000"/>
+        <a:lumOff val="35000"/>
+      </a:schemeClr>
+    </cs:fontRef>
+    <cs:spPr>
+      <a:ln w="9525" cap="flat" cmpd="sng" algn="ctr">
+        <a:solidFill>
+          <a:schemeClr val="tx1">
+            <a:lumMod val="15000"/>
+            <a:lumOff val="85000"/>
+          </a:schemeClr>
+        </a:solidFill>
+        <a:round/>
+      </a:ln>
+    </cs:spPr>
+    <cs:defRPr sz="800" kern="1200" cap="all" spc="120" normalizeH="0" baseline="0"/>
+  </cs:categoryAxis>
+  <cs:chartArea mods="allowNoFillOverride allowNoLineOverride">
+    <cs:lnRef idx="0"/>
+    <cs:fillRef idx="0"/>
+    <cs:effectRef idx="0"/>
+    <cs:fontRef idx="minor">
+      <a:schemeClr val="dk1"/>
+    </cs:fontRef>
+    <cs:spPr>
+      <a:solidFill>
+        <a:schemeClr val="lt1"/>
+      </a:solidFill>
+      <a:ln w="9525" cap="flat" cmpd="sng" algn="ctr">
+        <a:solidFill>
+          <a:schemeClr val="tx1">
+            <a:lumMod val="15000"/>
+            <a:lumOff val="85000"/>
+          </a:schemeClr>
+        </a:solidFill>
+        <a:round/>
+      </a:ln>
+    </cs:spPr>
+    <cs:defRPr sz="900" kern="1200"/>
+  </cs:chartArea>
+  <cs:dataLabel>
+    <cs:lnRef idx="0"/>
+    <cs:fillRef idx="0"/>
+    <cs:effectRef idx="0"/>
+    <cs:fontRef idx="minor">
+      <a:schemeClr val="tx1">
+        <a:lumMod val="50000"/>
+        <a:lumOff val="50000"/>
+      </a:schemeClr>
+    </cs:fontRef>
+    <cs:defRPr sz="900" b="0" i="0" u="none" strike="noStrike" kern="1200" baseline="0"/>
+  </cs:dataLabel>
+  <cs:dataLabelCallout>
+    <cs:lnRef idx="0"/>
+    <cs:fillRef idx="0"/>
+    <cs:effectRef idx="0"/>
+    <cs:fontRef idx="minor">
+      <a:schemeClr val="dk1">
+        <a:lumMod val="65000"/>
+        <a:lumOff val="35000"/>
+      </a:schemeClr>
+    </cs:fontRef>
+    <cs:spPr>
+      <a:solidFill>
+        <a:schemeClr val="lt1"/>
+      </a:solidFill>
+      <a:ln>
+        <a:solidFill>
+          <a:schemeClr val="dk1">
+            <a:lumMod val="25000"/>
+            <a:lumOff val="75000"/>
+          </a:schemeClr>
+        </a:solidFill>
+      </a:ln>
+    </cs:spPr>
+    <cs:defRPr sz="900" kern="1200"/>
+    <cs:bodyPr rot="0" spcFirstLastPara="1" vertOverflow="clip" horzOverflow="clip" vert="horz" wrap="square" lIns="36576" tIns="18288" rIns="36576" bIns="18288" anchor="ctr" anchorCtr="1">
+      <a:spAutoFit/>
+    </cs:bodyPr>
+  </cs:dataLabelCallout>
+  <cs:dataPoint>
+    <cs:lnRef idx="0"/>
+    <cs:fillRef idx="0">
+      <cs:styleClr val="auto"/>
+    </cs:fillRef>
+    <cs:effectRef idx="0"/>
+    <cs:fontRef idx="minor">
+      <a:schemeClr val="dk1"/>
+    </cs:fontRef>
+    <cs:spPr>
+      <a:solidFill>
+        <a:schemeClr val="phClr"/>
+      </a:solidFill>
+    </cs:spPr>
+  </cs:dataPoint>
+  <cs:dataPoint3D>
+    <cs:lnRef idx="0"/>
+    <cs:fillRef idx="0">
+      <cs:styleClr val="auto"/>
+    </cs:fillRef>
+    <cs:effectRef idx="0"/>
+    <cs:fontRef idx="minor">
+      <a:schemeClr val="dk1"/>
+    </cs:fontRef>
+    <cs:spPr>
+      <a:solidFill>
+        <a:schemeClr val="phClr"/>
+      </a:solidFill>
+    </cs:spPr>
+  </cs:dataPoint3D>
+  <cs:dataPointLine>
+    <cs:lnRef idx="0">
+      <cs:styleClr val="auto"/>
+    </cs:lnRef>
+    <cs:fillRef idx="0"/>
+    <cs:effectRef idx="0"/>
+    <cs:fontRef idx="minor">
+      <a:schemeClr val="dk1"/>
+    </cs:fontRef>
+    <cs:spPr>
+      <a:ln w="22225" cap="rnd">
+        <a:solidFill>
+          <a:schemeClr val="phClr"/>
+        </a:solidFill>
+        <a:round/>
+      </a:ln>
+    </cs:spPr>
+  </cs:dataPointLine>
+  <cs:dataPointMarker>
+    <cs:lnRef idx="0">
+      <cs:styleClr val="auto"/>
+    </cs:lnRef>
+    <cs:fillRef idx="0">
+      <cs:styleClr val="auto"/>
+    </cs:fillRef>
+    <cs:effectRef idx="0"/>
+    <cs:fontRef idx="minor">
+      <a:schemeClr val="dk1"/>
+    </cs:fontRef>
+    <cs:spPr>
+      <a:solidFill>
+        <a:schemeClr val="phClr"/>
+      </a:solidFill>
+      <a:ln w="9525">
+        <a:solidFill>
+          <a:schemeClr val="phClr"/>
+        </a:solidFill>
+        <a:round/>
+      </a:ln>
+    </cs:spPr>
+  </cs:dataPointMarker>
+  <cs:dataPointMarkerLayout size="6"/>
+  <cs:dataPointWireframe>
+    <cs:lnRef idx="0">
+      <cs:styleClr val="auto"/>
+    </cs:lnRef>
+    <cs:fillRef idx="0"/>
+    <cs:effectRef idx="0"/>
+    <cs:fontRef idx="minor">
+      <a:schemeClr val="dk1"/>
+    </cs:fontRef>
+    <cs:spPr>
+      <a:ln w="9525" cap="rnd">
+        <a:solidFill>
+          <a:schemeClr val="phClr"/>
+        </a:solidFill>
+        <a:round/>
+      </a:ln>
+    </cs:spPr>
+  </cs:dataPointWireframe>
+  <cs:dataTable>
+    <cs:lnRef idx="0"/>
+    <cs:fillRef idx="0"/>
+    <cs:effectRef idx="0"/>
+    <cs:fontRef idx="minor">
+      <a:schemeClr val="tx1">
+        <a:lumMod val="65000"/>
+        <a:lumOff val="35000"/>
+      </a:schemeClr>
+    </cs:fontRef>
+    <cs:spPr>
+      <a:ln w="9525">
+        <a:solidFill>
+          <a:schemeClr val="tx1">
+            <a:lumMod val="15000"/>
+            <a:lumOff val="85000"/>
+          </a:schemeClr>
+        </a:solidFill>
+      </a:ln>
+    </cs:spPr>
+    <cs:defRPr sz="900" kern="1200"/>
+  </cs:dataTable>
+  <cs:downBar>
+    <cs:lnRef idx="0"/>
+    <cs:fillRef idx="0"/>
+    <cs:effectRef idx="0"/>
+    <cs:fontRef idx="minor">
+      <a:schemeClr val="dk1"/>
+    </cs:fontRef>
+    <cs:spPr>
+      <a:solidFill>
+        <a:schemeClr val="dk1">
+          <a:lumMod val="75000"/>
+          <a:lumOff val="25000"/>
+        </a:schemeClr>
+      </a:solidFill>
+      <a:ln w="9525">
+        <a:solidFill>
+          <a:schemeClr val="tx1">
+            <a:lumMod val="15000"/>
+            <a:lumOff val="85000"/>
+          </a:schemeClr>
+        </a:solidFill>
+      </a:ln>
+    </cs:spPr>
+  </cs:downBar>
+  <cs:dropLine>
+    <cs:lnRef idx="0"/>
+    <cs:fillRef idx="0"/>
+    <cs:effectRef idx="0"/>
+    <cs:fontRef idx="minor">
+      <a:schemeClr val="dk1"/>
+    </cs:fontRef>
+    <cs:spPr>
+      <a:ln w="9525">
+        <a:solidFill>
+          <a:schemeClr val="tx1">
+            <a:lumMod val="35000"/>
+            <a:lumOff val="65000"/>
+          </a:schemeClr>
+        </a:solidFill>
+      </a:ln>
+    </cs:spPr>
+  </cs:dropLine>
+  <cs:errorBar>
+    <cs:lnRef idx="0"/>
+    <cs:fillRef idx="0"/>
+    <cs:effectRef idx="0"/>
+    <cs:fontRef idx="minor">
+      <a:schemeClr val="dk1"/>
+    </cs:fontRef>
+    <cs:spPr>
+      <a:ln w="9525">
+        <a:solidFill>
+          <a:schemeClr val="tx1">
+            <a:lumMod val="65000"/>
+            <a:lumOff val="35000"/>
+          </a:schemeClr>
+        </a:solidFill>
+        <a:round/>
+      </a:ln>
+    </cs:spPr>
+  </cs:errorBar>
+  <cs:floor>
+    <cs:lnRef idx="0"/>
+    <cs:fillRef idx="0"/>
+    <cs:effectRef idx="0"/>
+    <cs:fontRef idx="minor">
+      <a:schemeClr val="dk1"/>
+    </cs:fontRef>
+  </cs:floor>
+  <cs:gridlineMajor>
+    <cs:lnRef idx="0"/>
+    <cs:fillRef idx="0"/>
+    <cs:effectRef idx="0"/>
+    <cs:fontRef idx="minor">
+      <a:schemeClr val="dk1"/>
+    </cs:fontRef>
+    <cs:spPr>
+      <a:ln w="9525" cap="flat" cmpd="sng" algn="ctr">
+        <a:solidFill>
+          <a:schemeClr val="tx1">
+            <a:lumMod val="15000"/>
+            <a:lumOff val="85000"/>
+          </a:schemeClr>
+        </a:solidFill>
+        <a:round/>
+      </a:ln>
+    </cs:spPr>
+  </cs:gridlineMajor>
+  <cs:gridlineMinor>
+    <cs:lnRef idx="0"/>
+    <cs:fillRef idx="0"/>
+    <cs:effectRef idx="0"/>
+    <cs:fontRef idx="minor">
+      <a:schemeClr val="dk1"/>
+    </cs:fontRef>
+    <cs:spPr>
+      <a:ln>
+        <a:solidFill>
+          <a:schemeClr val="tx1">
+            <a:lumMod val="5000"/>
+            <a:lumOff val="95000"/>
+          </a:schemeClr>
+        </a:solidFill>
+      </a:ln>
+    </cs:spPr>
+  </cs:gridlineMinor>
+  <cs:hiLoLine>
+    <cs:lnRef idx="0"/>
+    <cs:fillRef idx="0"/>
+    <cs:effectRef idx="0"/>
+    <cs:fontRef idx="minor">
+      <a:schemeClr val="dk1"/>
+    </cs:fontRef>
+    <cs:spPr>
+      <a:ln w="9525">
+        <a:solidFill>
+          <a:schemeClr val="tx1">
+            <a:lumMod val="50000"/>
+            <a:lumOff val="50000"/>
+          </a:schemeClr>
+        </a:solidFill>
+      </a:ln>
+    </cs:spPr>
+  </cs:hiLoLine>
+  <cs:leaderLine>
+    <cs:lnRef idx="0"/>
+    <cs:fillRef idx="0"/>
+    <cs:effectRef idx="0"/>
+    <cs:fontRef idx="minor">
+      <a:schemeClr val="dk1"/>
+    </cs:fontRef>
+    <cs:spPr>
+      <a:ln w="9525">
+        <a:solidFill>
+          <a:schemeClr val="tx1">
+            <a:lumMod val="35000"/>
+            <a:lumOff val="65000"/>
+          </a:schemeClr>
+        </a:solidFill>
+      </a:ln>
+    </cs:spPr>
+  </cs:leaderLine>
+  <cs:legend>
+    <cs:lnRef idx="0"/>
+    <cs:fillRef idx="0"/>
+    <cs:effectRef idx="0"/>
+    <cs:fontRef idx="minor">
+      <a:schemeClr val="tx1">
+        <a:lumMod val="65000"/>
+        <a:lumOff val="35000"/>
+      </a:schemeClr>
+    </cs:fontRef>
+    <cs:defRPr sz="900" kern="1200"/>
+  </cs:legend>
+  <cs:plotArea mods="allowNoFillOverride allowNoLineOverride">
+    <cs:lnRef idx="0"/>
+    <cs:fillRef idx="0"/>
+    <cs:effectRef idx="0"/>
+    <cs:fontRef idx="minor">
+      <a:schemeClr val="dk1"/>
+    </cs:fontRef>
+  </cs:plotArea>
+  <cs:plotArea3D mods="allowNoFillOverride allowNoLineOverride">
+    <cs:lnRef idx="0"/>
+    <cs:fillRef idx="0"/>
+    <cs:effectRef idx="0"/>
+    <cs:fontRef idx="minor">
+      <a:schemeClr val="dk1"/>
+    </cs:fontRef>
+  </cs:plotArea3D>
+  <cs:seriesAxis>
+    <cs:lnRef idx="0"/>
+    <cs:fillRef idx="0"/>
+    <cs:effectRef idx="0"/>
+    <cs:fontRef idx="minor">
+      <a:schemeClr val="tx1">
+        <a:lumMod val="65000"/>
+        <a:lumOff val="35000"/>
+      </a:schemeClr>
+    </cs:fontRef>
+    <cs:spPr>
+      <a:ln w="9525" cap="flat" cmpd="sng" algn="ctr">
+        <a:solidFill>
+          <a:schemeClr val="tx1">
+            <a:lumMod val="15000"/>
+            <a:lumOff val="85000"/>
+          </a:schemeClr>
+        </a:solidFill>
+        <a:round/>
+      </a:ln>
+    </cs:spPr>
+    <cs:defRPr sz="900" kern="1200"/>
+  </cs:seriesAxis>
+  <cs:seriesLine>
+    <cs:lnRef idx="0"/>
+    <cs:fillRef idx="0"/>
+    <cs:effectRef idx="0"/>
+    <cs:fontRef idx="minor">
+      <a:schemeClr val="dk1"/>
+    </cs:fontRef>
+    <cs:spPr>
+      <a:ln w="9525">
+        <a:solidFill>
+          <a:schemeClr val="tx1">
+            <a:lumMod val="35000"/>
+            <a:lumOff val="65000"/>
+          </a:schemeClr>
+        </a:solidFill>
+        <a:round/>
+      </a:ln>
+    </cs:spPr>
+  </cs:seriesLine>
+  <cs:title>
+    <cs:lnRef idx="0"/>
+    <cs:fillRef idx="0"/>
+    <cs:effectRef idx="0"/>
+    <cs:fontRef idx="minor">
+      <a:schemeClr val="tx1">
+        <a:lumMod val="65000"/>
+        <a:lumOff val="35000"/>
+      </a:schemeClr>
+    </cs:fontRef>
+    <cs:defRPr sz="1600" b="1" kern="1200" cap="all" spc="120" normalizeH="0" baseline="0"/>
+  </cs:title>
+  <cs:trendline>
+    <cs:lnRef idx="0">
+      <cs:styleClr val="auto"/>
+    </cs:lnRef>
+    <cs:fillRef idx="0"/>
+    <cs:effectRef idx="0"/>
+    <cs:fontRef idx="minor">
+      <a:schemeClr val="dk1"/>
+    </cs:fontRef>
+    <cs:spPr>
+      <a:ln w="19050" cap="rnd">
+        <a:solidFill>
+          <a:schemeClr val="phClr"/>
+        </a:solidFill>
+        <a:prstDash val="sysDash"/>
+      </a:ln>
+    </cs:spPr>
+  </cs:trendline>
+  <cs:trendlineLabel>
+    <cs:lnRef idx="0"/>
+    <cs:fillRef idx="0"/>
+    <cs:effectRef idx="0"/>
+    <cs:fontRef idx="minor">
+      <a:schemeClr val="tx1">
+        <a:lumMod val="65000"/>
+        <a:lumOff val="35000"/>
+      </a:schemeClr>
+    </cs:fontRef>
+    <cs:defRPr sz="800" kern="1200"/>
+  </cs:trendlineLabel>
+  <cs:upBar>
+    <cs:lnRef idx="0"/>
+    <cs:fillRef idx="0"/>
+    <cs:effectRef idx="0"/>
+    <cs:fontRef idx="minor">
+      <a:schemeClr val="dk1"/>
+    </cs:fontRef>
+    <cs:spPr>
+      <a:solidFill>
+        <a:schemeClr val="lt1"/>
+      </a:solidFill>
+      <a:ln w="9525">
+        <a:solidFill>
+          <a:schemeClr val="tx1">
+            <a:lumMod val="65000"/>
+            <a:lumOff val="35000"/>
+          </a:schemeClr>
+        </a:solidFill>
+      </a:ln>
+    </cs:spPr>
+  </cs:upBar>
+  <cs:valueAxis>
+    <cs:lnRef idx="0"/>
+    <cs:fillRef idx="0"/>
+    <cs:effectRef idx="0"/>
+    <cs:fontRef idx="minor">
+      <a:schemeClr val="tx1">
+        <a:lumMod val="65000"/>
+        <a:lumOff val="35000"/>
+      </a:schemeClr>
+    </cs:fontRef>
+    <cs:spPr>
+      <a:ln w="9525" cap="flat" cmpd="sng" algn="ctr">
+        <a:solidFill>
+          <a:schemeClr val="dk1">
+            <a:lumMod val="15000"/>
+            <a:lumOff val="85000"/>
+          </a:schemeClr>
+        </a:solidFill>
+        <a:round/>
+      </a:ln>
+    </cs:spPr>
+    <cs:defRPr sz="900" kern="1200"/>
+  </cs:valueAxis>
+  <cs:wall>
+    <cs:lnRef idx="0"/>
+    <cs:fillRef idx="0"/>
+    <cs:effectRef idx="0"/>
+    <cs:fontRef idx="minor">
+      <a:schemeClr val="dk1"/>
+    </cs:fontRef>
+  </cs:wall>
+</cs:chartStyle>
+</file>
+
+<file path=ppt/charts/style2.xml><?xml version="1.0" encoding="utf-8"?>
 <cs:chartStyle xmlns:cs="http://schemas.microsoft.com/office/drawing/2012/chartStyle" xmlns:a="http://schemas.openxmlformats.org/drawingml/2006/main" id="239">
   <cs:axisTitle>
     <cs:lnRef idx="0"/>
@@ -1394,7 +2384,7 @@
           <a:p>
             <a:fld id="{6DEEE2A7-2233-4BA6-A449-2FEA2BD7EF77}" type="datetimeFigureOut">
               <a:rPr lang="fr-MA" smtClean="0"/>
-              <a:t>13/09/2025</a:t>
+              <a:t>25/10/2025</a:t>
             </a:fld>
             <a:endParaRPr lang="fr-MA"/>
           </a:p>
@@ -1594,7 +2584,7 @@
           <a:p>
             <a:fld id="{6DEEE2A7-2233-4BA6-A449-2FEA2BD7EF77}" type="datetimeFigureOut">
               <a:rPr lang="fr-MA" smtClean="0"/>
-              <a:t>13/09/2025</a:t>
+              <a:t>25/10/2025</a:t>
             </a:fld>
             <a:endParaRPr lang="fr-MA"/>
           </a:p>
@@ -1804,7 +2794,7 @@
           <a:p>
             <a:fld id="{6DEEE2A7-2233-4BA6-A449-2FEA2BD7EF77}" type="datetimeFigureOut">
               <a:rPr lang="fr-MA" smtClean="0"/>
-              <a:t>13/09/2025</a:t>
+              <a:t>25/10/2025</a:t>
             </a:fld>
             <a:endParaRPr lang="fr-MA"/>
           </a:p>
@@ -2004,7 +2994,7 @@
           <a:p>
             <a:fld id="{6DEEE2A7-2233-4BA6-A449-2FEA2BD7EF77}" type="datetimeFigureOut">
               <a:rPr lang="fr-MA" smtClean="0"/>
-              <a:t>13/09/2025</a:t>
+              <a:t>25/10/2025</a:t>
             </a:fld>
             <a:endParaRPr lang="fr-MA"/>
           </a:p>
@@ -2280,7 +3270,7 @@
           <a:p>
             <a:fld id="{6DEEE2A7-2233-4BA6-A449-2FEA2BD7EF77}" type="datetimeFigureOut">
               <a:rPr lang="fr-MA" smtClean="0"/>
-              <a:t>13/09/2025</a:t>
+              <a:t>25/10/2025</a:t>
             </a:fld>
             <a:endParaRPr lang="fr-MA"/>
           </a:p>
@@ -2548,7 +3538,7 @@
           <a:p>
             <a:fld id="{6DEEE2A7-2233-4BA6-A449-2FEA2BD7EF77}" type="datetimeFigureOut">
               <a:rPr lang="fr-MA" smtClean="0"/>
-              <a:t>13/09/2025</a:t>
+              <a:t>25/10/2025</a:t>
             </a:fld>
             <a:endParaRPr lang="fr-MA"/>
           </a:p>
@@ -2963,7 +3953,7 @@
           <a:p>
             <a:fld id="{6DEEE2A7-2233-4BA6-A449-2FEA2BD7EF77}" type="datetimeFigureOut">
               <a:rPr lang="fr-MA" smtClean="0"/>
-              <a:t>13/09/2025</a:t>
+              <a:t>25/10/2025</a:t>
             </a:fld>
             <a:endParaRPr lang="fr-MA"/>
           </a:p>
@@ -3105,7 +4095,7 @@
           <a:p>
             <a:fld id="{6DEEE2A7-2233-4BA6-A449-2FEA2BD7EF77}" type="datetimeFigureOut">
               <a:rPr lang="fr-MA" smtClean="0"/>
-              <a:t>13/09/2025</a:t>
+              <a:t>25/10/2025</a:t>
             </a:fld>
             <a:endParaRPr lang="fr-MA"/>
           </a:p>
@@ -3218,7 +4208,7 @@
           <a:p>
             <a:fld id="{6DEEE2A7-2233-4BA6-A449-2FEA2BD7EF77}" type="datetimeFigureOut">
               <a:rPr lang="fr-MA" smtClean="0"/>
-              <a:t>13/09/2025</a:t>
+              <a:t>25/10/2025</a:t>
             </a:fld>
             <a:endParaRPr lang="fr-MA"/>
           </a:p>
@@ -3531,7 +4521,7 @@
           <a:p>
             <a:fld id="{6DEEE2A7-2233-4BA6-A449-2FEA2BD7EF77}" type="datetimeFigureOut">
               <a:rPr lang="fr-MA" smtClean="0"/>
-              <a:t>13/09/2025</a:t>
+              <a:t>25/10/2025</a:t>
             </a:fld>
             <a:endParaRPr lang="fr-MA"/>
           </a:p>
@@ -3820,7 +4810,7 @@
           <a:p>
             <a:fld id="{6DEEE2A7-2233-4BA6-A449-2FEA2BD7EF77}" type="datetimeFigureOut">
               <a:rPr lang="fr-MA" smtClean="0"/>
-              <a:t>13/09/2025</a:t>
+              <a:t>25/10/2025</a:t>
             </a:fld>
             <a:endParaRPr lang="fr-MA"/>
           </a:p>
@@ -4063,7 +5053,7 @@
           <a:p>
             <a:fld id="{6DEEE2A7-2233-4BA6-A449-2FEA2BD7EF77}" type="datetimeFigureOut">
               <a:rPr lang="fr-MA" smtClean="0"/>
-              <a:t>13/09/2025</a:t>
+              <a:t>25/10/2025</a:t>
             </a:fld>
             <a:endParaRPr lang="fr-MA"/>
           </a:p>
@@ -7510,6 +8500,226 @@
 </p:sld>
 </file>
 
+<file path=ppt/slides/slide2.xml><?xml version="1.0" encoding="utf-8"?>
+<p:sld xmlns:a="http://schemas.openxmlformats.org/drawingml/2006/main" xmlns:r="http://schemas.openxmlformats.org/officeDocument/2006/relationships" xmlns:p="http://schemas.openxmlformats.org/presentationml/2006/main">
+  <p:cSld>
+    <p:spTree>
+      <p:nvGrpSpPr>
+        <p:cNvPr id="1" name="">
+          <a:extLst>
+            <a:ext uri="{FF2B5EF4-FFF2-40B4-BE49-F238E27FC236}">
+              <a16:creationId xmlns:a16="http://schemas.microsoft.com/office/drawing/2014/main" id="{AD1A1407-2E80-8430-8E63-CA159CAF06AB}"/>
+            </a:ext>
+          </a:extLst>
+        </p:cNvPr>
+        <p:cNvGrpSpPr/>
+        <p:nvPr/>
+      </p:nvGrpSpPr>
+      <p:grpSpPr>
+        <a:xfrm>
+          <a:off x="0" y="0"/>
+          <a:ext cx="0" cy="0"/>
+          <a:chOff x="0" y="0"/>
+          <a:chExt cx="0" cy="0"/>
+        </a:xfrm>
+      </p:grpSpPr>
+      <p:sp>
+        <p:nvSpPr>
+          <p:cNvPr id="19" name="Rectangle1">
+            <a:extLst>
+              <a:ext uri="{FF2B5EF4-FFF2-40B4-BE49-F238E27FC236}">
+                <a16:creationId xmlns:a16="http://schemas.microsoft.com/office/drawing/2014/main" id="{E40B3072-1F37-30B4-48DB-5D958ECD2B83}"/>
+              </a:ext>
+            </a:extLst>
+          </p:cNvPr>
+          <p:cNvSpPr/>
+          <p:nvPr/>
+        </p:nvSpPr>
+        <p:spPr>
+          <a:xfrm>
+            <a:off x="7640320" y="106979"/>
+            <a:ext cx="2753958" cy="827742"/>
+          </a:xfrm>
+          <a:prstGeom prst="rect">
+            <a:avLst/>
+          </a:prstGeom>
+          <a:solidFill>
+            <a:schemeClr val="tx2">
+              <a:lumMod val="10000"/>
+              <a:lumOff val="90000"/>
+            </a:schemeClr>
+          </a:solidFill>
+          <a:ln>
+            <a:solidFill>
+              <a:schemeClr val="bg1">
+                <a:lumMod val="95000"/>
+              </a:schemeClr>
+            </a:solidFill>
+          </a:ln>
+        </p:spPr>
+        <p:style>
+          <a:lnRef idx="2">
+            <a:schemeClr val="accent1">
+              <a:shade val="15000"/>
+            </a:schemeClr>
+          </a:lnRef>
+          <a:fillRef idx="1">
+            <a:schemeClr val="accent1"/>
+          </a:fillRef>
+          <a:effectRef idx="0">
+            <a:schemeClr val="accent1"/>
+          </a:effectRef>
+          <a:fontRef idx="minor">
+            <a:schemeClr val="lt1"/>
+          </a:fontRef>
+        </p:style>
+        <p:txBody>
+          <a:bodyPr rtlCol="0" anchor="ctr"/>
+          <a:lstStyle/>
+          <a:p>
+            <a:pPr algn="ctr"/>
+            <a:endParaRPr lang="fr-MA" sz="4800" dirty="0">
+              <a:solidFill>
+                <a:schemeClr val="tx2"/>
+              </a:solidFill>
+              <a:latin typeface="+mj-lt"/>
+            </a:endParaRPr>
+          </a:p>
+        </p:txBody>
+      </p:sp>
+      <p:sp>
+        <p:nvSpPr>
+          <p:cNvPr id="20" name="ZoneTexte1">
+            <a:extLst>
+              <a:ext uri="{FF2B5EF4-FFF2-40B4-BE49-F238E27FC236}">
+                <a16:creationId xmlns:a16="http://schemas.microsoft.com/office/drawing/2014/main" id="{3F09E26C-F3ED-4BE0-E767-DA8B2B481677}"/>
+              </a:ext>
+            </a:extLst>
+          </p:cNvPr>
+          <p:cNvSpPr txBox="1"/>
+          <p:nvPr/>
+        </p:nvSpPr>
+        <p:spPr>
+          <a:xfrm>
+            <a:off x="8446547" y="227702"/>
+            <a:ext cx="1861073" cy="523220"/>
+          </a:xfrm>
+          <a:prstGeom prst="rect">
+            <a:avLst/>
+          </a:prstGeom>
+          <a:noFill/>
+        </p:spPr>
+        <p:txBody>
+          <a:bodyPr wrap="square" rtlCol="0">
+            <a:spAutoFit/>
+          </a:bodyPr>
+          <a:lstStyle/>
+          <a:p>
+            <a:r>
+              <a:rPr lang="fr-MA" sz="2800" b="1" i="0" u="none" strike="noStrike">
+                <a:solidFill>
+                  <a:srgbClr val="00B050"/>
+                </a:solidFill>
+                <a:effectLst/>
+                <a:latin typeface="Abadi Extra Light" panose="020B0204020104020204" pitchFamily="34" charset="0"/>
+              </a:rPr>
+              <a:t>1.414</a:t>
+            </a:r>
+            <a:r>
+              <a:rPr lang="fr-MA" sz="2800">
+                <a:effectLst/>
+              </a:rPr>
+              <a:t> </a:t>
+            </a:r>
+            <a:endParaRPr lang="fr-MA" sz="2800" b="1" dirty="0"/>
+          </a:p>
+        </p:txBody>
+      </p:sp>
+      <p:sp>
+        <p:nvSpPr>
+          <p:cNvPr id="21" name="ZoneTexte2">
+            <a:extLst>
+              <a:ext uri="{FF2B5EF4-FFF2-40B4-BE49-F238E27FC236}">
+                <a16:creationId xmlns:a16="http://schemas.microsoft.com/office/drawing/2014/main" id="{FC9EFDC8-F65E-79AF-E367-843BCEC60818}"/>
+              </a:ext>
+            </a:extLst>
+          </p:cNvPr>
+          <p:cNvSpPr txBox="1"/>
+          <p:nvPr/>
+        </p:nvSpPr>
+        <p:spPr>
+          <a:xfrm>
+            <a:off x="9759576" y="588682"/>
+            <a:ext cx="946674" cy="369332"/>
+          </a:xfrm>
+          <a:prstGeom prst="rect">
+            <a:avLst/>
+          </a:prstGeom>
+          <a:noFill/>
+        </p:spPr>
+        <p:txBody>
+          <a:bodyPr wrap="square" rtlCol="0">
+            <a:spAutoFit/>
+          </a:bodyPr>
+          <a:lstStyle/>
+          <a:p>
+            <a:r>
+              <a:rPr lang="fr-MA" sz="1800" b="1" i="0" u="none" strike="noStrike">
+                <a:solidFill>
+                  <a:srgbClr val="FF0000"/>
+                </a:solidFill>
+                <a:effectLst/>
+                <a:latin typeface="Agency FB" panose="020B0503020202020204" pitchFamily="34" charset="0"/>
+              </a:rPr>
+              <a:t>9,901%</a:t>
+            </a:r>
+            <a:r>
+              <a:rPr lang="fr-MA">
+                <a:effectLst/>
+              </a:rPr>
+              <a:t> </a:t>
+            </a:r>
+            <a:endParaRPr lang="fr-MA" dirty="0"/>
+          </a:p>
+        </p:txBody>
+      </p:sp>
+      <p:graphicFrame>
+        <p:nvGraphicFramePr>
+          <p:cNvPr id="3" name="Graphique1">
+            <a:extLst>
+              <a:ext uri="{FF2B5EF4-FFF2-40B4-BE49-F238E27FC236}">
+                <a16:creationId xmlns:a16="http://schemas.microsoft.com/office/drawing/2014/main" id="{1064CD6A-4FCC-D485-4950-299A9368877B}"/>
+              </a:ext>
+            </a:extLst>
+          </p:cNvPr>
+          <p:cNvGraphicFramePr>
+            <a:graphicFrameLocks/>
+          </p:cNvGraphicFramePr>
+          <p:nvPr/>
+        </p:nvGraphicFramePr>
+        <p:xfrm>
+          <a:off x="592648" y="1455207"/>
+          <a:ext cx="6274643" cy="3990544"/>
+        </p:xfrm>
+        <a:graphic>
+          <a:graphicData uri="http://schemas.openxmlformats.org/drawingml/2006/chart">
+            <c:chart xmlns:c="http://schemas.openxmlformats.org/drawingml/2006/chart" xmlns:r="http://schemas.openxmlformats.org/officeDocument/2006/relationships" r:id="rId2"/>
+          </a:graphicData>
+        </a:graphic>
+      </p:graphicFrame>
+    </p:spTree>
+    <p:extLst>
+      <p:ext uri="{BB962C8B-B14F-4D97-AF65-F5344CB8AC3E}">
+        <p14:creationId xmlns:p14="http://schemas.microsoft.com/office/powerpoint/2010/main" val="1494487281"/>
+      </p:ext>
+    </p:extLst>
+  </p:cSld>
+  <p:clrMapOvr>
+    <a:masterClrMapping/>
+  </p:clrMapOvr>
+</p:sld>
+</file>
+
 <file path=ppt/theme/theme1.xml><?xml version="1.0" encoding="utf-8"?>
 <a:theme xmlns:a="http://schemas.openxmlformats.org/drawingml/2006/main" name="Thème Office">
   <a:themeElements>

</xml_diff>